<commit_message>
Added week 13 files.
</commit_message>
<xml_diff>
--- a/2024-SPR/Week12.pptx
+++ b/2024-SPR/Week12.pptx
@@ -3403,24 +3403,14 @@
                   </a:schemeClr>
                 </a:solidFill>
               </a:rPr>
-              <a:t>Week 12: 2024-04-04 </a:t>
-            </a:r>
-            <a:r>
-              <a:rPr lang="en-US">
-                <a:solidFill>
-                  <a:schemeClr val="accent1">
-                    <a:lumMod val="50000"/>
-                  </a:schemeClr>
-                </a:solidFill>
-              </a:rPr>
-              <a:t>to </a:t>
-            </a:r>
-            <a:r>
-              <a:rPr lang="en-US"/>
+              <a:t>Week 12: 2024-04-04 to </a:t>
+            </a:r>
+            <a:r>
+              <a:rPr lang="en-US" dirty="0"/>
               <a:t>04</a:t>
             </a:r>
             <a:r>
-              <a:rPr lang="en-US">
+              <a:rPr lang="en-US" dirty="0">
                 <a:solidFill>
                   <a:schemeClr val="accent1">
                     <a:lumMod val="50000"/>
@@ -3429,13 +3419,6 @@
               </a:rPr>
               <a:t>-10</a:t>
             </a:r>
-            <a:endParaRPr lang="en-US" dirty="0">
-              <a:solidFill>
-                <a:schemeClr val="accent1">
-                  <a:lumMod val="50000"/>
-                </a:schemeClr>
-              </a:solidFill>
-            </a:endParaRPr>
           </a:p>
           <a:p>
             <a:r>

</xml_diff>